<commit_message>
added bokeh to list
</commit_message>
<xml_diff>
--- a/D3/introToD3.pptx
+++ b/D3/introToD3.pptx
@@ -218,7 +218,7 @@
           <a:p>
             <a:fld id="{5C7B60CB-4555-4E4C-8A61-26D94E33D181}" type="datetimeFigureOut">
               <a:rPr lang="en-US" smtClean="0"/>
-              <a:t>8/19/19</a:t>
+              <a:t>9/4/19</a:t>
             </a:fld>
             <a:endParaRPr lang="en-US"/>
           </a:p>
@@ -1926,7 +1926,7 @@
           <a:p>
             <a:fld id="{C336076D-836C-44D8-B1E0-272F963C7580}" type="datetimeFigureOut">
               <a:rPr lang="en-US" smtClean="0"/>
-              <a:t>8/19/19</a:t>
+              <a:t>9/4/19</a:t>
             </a:fld>
             <a:endParaRPr lang="en-US"/>
           </a:p>
@@ -2104,7 +2104,7 @@
           <a:p>
             <a:fld id="{C336076D-836C-44D8-B1E0-272F963C7580}" type="datetimeFigureOut">
               <a:rPr lang="en-US" smtClean="0"/>
-              <a:t>8/19/19</a:t>
+              <a:t>9/4/19</a:t>
             </a:fld>
             <a:endParaRPr lang="en-US"/>
           </a:p>
@@ -2292,7 +2292,7 @@
           <a:p>
             <a:fld id="{C336076D-836C-44D8-B1E0-272F963C7580}" type="datetimeFigureOut">
               <a:rPr lang="en-US" smtClean="0"/>
-              <a:t>8/19/19</a:t>
+              <a:t>9/4/19</a:t>
             </a:fld>
             <a:endParaRPr lang="en-US"/>
           </a:p>
@@ -2470,7 +2470,7 @@
           <a:p>
             <a:fld id="{C336076D-836C-44D8-B1E0-272F963C7580}" type="datetimeFigureOut">
               <a:rPr lang="en-US" smtClean="0"/>
-              <a:t>8/19/19</a:t>
+              <a:t>9/4/19</a:t>
             </a:fld>
             <a:endParaRPr lang="en-US"/>
           </a:p>
@@ -2724,7 +2724,7 @@
           <a:p>
             <a:fld id="{C336076D-836C-44D8-B1E0-272F963C7580}" type="datetimeFigureOut">
               <a:rPr lang="en-US" smtClean="0"/>
-              <a:t>8/19/19</a:t>
+              <a:t>9/4/19</a:t>
             </a:fld>
             <a:endParaRPr lang="en-US"/>
           </a:p>
@@ -2964,7 +2964,7 @@
           <a:p>
             <a:fld id="{C336076D-836C-44D8-B1E0-272F963C7580}" type="datetimeFigureOut">
               <a:rPr lang="en-US" smtClean="0"/>
-              <a:t>8/19/19</a:t>
+              <a:t>9/4/19</a:t>
             </a:fld>
             <a:endParaRPr lang="en-US"/>
           </a:p>
@@ -3339,7 +3339,7 @@
           <a:p>
             <a:fld id="{C336076D-836C-44D8-B1E0-272F963C7580}" type="datetimeFigureOut">
               <a:rPr lang="en-US" smtClean="0"/>
-              <a:t>8/19/19</a:t>
+              <a:t>9/4/19</a:t>
             </a:fld>
             <a:endParaRPr lang="en-US"/>
           </a:p>
@@ -3465,7 +3465,7 @@
           <a:p>
             <a:fld id="{C336076D-836C-44D8-B1E0-272F963C7580}" type="datetimeFigureOut">
               <a:rPr lang="en-US" smtClean="0"/>
-              <a:t>8/19/19</a:t>
+              <a:t>9/4/19</a:t>
             </a:fld>
             <a:endParaRPr lang="en-US"/>
           </a:p>
@@ -3568,7 +3568,7 @@
           <a:p>
             <a:fld id="{C336076D-836C-44D8-B1E0-272F963C7580}" type="datetimeFigureOut">
               <a:rPr lang="en-US" smtClean="0"/>
-              <a:t>8/19/19</a:t>
+              <a:t>9/4/19</a:t>
             </a:fld>
             <a:endParaRPr lang="en-US"/>
           </a:p>
@@ -3853,7 +3853,7 @@
           <a:p>
             <a:fld id="{C336076D-836C-44D8-B1E0-272F963C7580}" type="datetimeFigureOut">
               <a:rPr lang="en-US" smtClean="0"/>
-              <a:t>8/19/19</a:t>
+              <a:t>9/4/19</a:t>
             </a:fld>
             <a:endParaRPr lang="en-US"/>
           </a:p>
@@ -4118,7 +4118,7 @@
           <a:p>
             <a:fld id="{C336076D-836C-44D8-B1E0-272F963C7580}" type="datetimeFigureOut">
               <a:rPr lang="en-US" smtClean="0"/>
-              <a:t>8/19/19</a:t>
+              <a:t>9/4/19</a:t>
             </a:fld>
             <a:endParaRPr lang="en-US"/>
           </a:p>
@@ -4334,7 +4334,7 @@
           <a:p>
             <a:fld id="{C336076D-836C-44D8-B1E0-272F963C7580}" type="datetimeFigureOut">
               <a:rPr lang="en-US" smtClean="0"/>
-              <a:t>8/19/19</a:t>
+              <a:t>9/4/19</a:t>
             </a:fld>
             <a:endParaRPr lang="en-US"/>
           </a:p>
@@ -5109,11 +5109,16 @@
             </a:pPr>
             <a:r>
               <a:rPr lang="en-US" dirty="0"/>
-              <a:t>	</a:t>
-            </a:r>
-            <a:r>
-              <a:rPr lang="en-US" dirty="0" err="1"/>
-              <a:t>matplotlib</a:t>
+              <a:t>	matplotlib</a:t>
+            </a:r>
+          </a:p>
+          <a:p>
+            <a:pPr marL="0" indent="0">
+              <a:buNone/>
+            </a:pPr>
+            <a:r>
+              <a:rPr lang="en-US"/>
+              <a:t>	bokeh</a:t>
             </a:r>
             <a:endParaRPr lang="en-US" dirty="0"/>
           </a:p>

</xml_diff>